<commit_message>
done, still needs to be ready to send
</commit_message>
<xml_diff>
--- a/cbir/doc/cbir.pptx
+++ b/cbir/doc/cbir.pptx
@@ -298,7 +298,7 @@
             <a:fld id="{1BA50D42-C9CD-4801-B293-61D1F53EC57E}" type="datetimeFigureOut">
               <a:rPr lang="de-DE" smtClean="0"/>
               <a:pPr/>
-              <a:t>08.06.2014</a:t>
+              <a:t>09.06.2014</a:t>
             </a:fld>
             <a:endParaRPr lang="de-DE"/>
           </a:p>
@@ -465,7 +465,7 @@
             <a:fld id="{1BA50D42-C9CD-4801-B293-61D1F53EC57E}" type="datetimeFigureOut">
               <a:rPr lang="de-DE" smtClean="0"/>
               <a:pPr/>
-              <a:t>08.06.2014</a:t>
+              <a:t>09.06.2014</a:t>
             </a:fld>
             <a:endParaRPr lang="de-DE"/>
           </a:p>
@@ -642,7 +642,7 @@
             <a:fld id="{1BA50D42-C9CD-4801-B293-61D1F53EC57E}" type="datetimeFigureOut">
               <a:rPr lang="de-DE" smtClean="0"/>
               <a:pPr/>
-              <a:t>08.06.2014</a:t>
+              <a:t>09.06.2014</a:t>
             </a:fld>
             <a:endParaRPr lang="de-DE"/>
           </a:p>
@@ -809,7 +809,7 @@
             <a:fld id="{1BA50D42-C9CD-4801-B293-61D1F53EC57E}" type="datetimeFigureOut">
               <a:rPr lang="de-DE" smtClean="0"/>
               <a:pPr/>
-              <a:t>08.06.2014</a:t>
+              <a:t>09.06.2014</a:t>
             </a:fld>
             <a:endParaRPr lang="de-DE"/>
           </a:p>
@@ -1052,7 +1052,7 @@
             <a:fld id="{1BA50D42-C9CD-4801-B293-61D1F53EC57E}" type="datetimeFigureOut">
               <a:rPr lang="de-DE" smtClean="0"/>
               <a:pPr/>
-              <a:t>08.06.2014</a:t>
+              <a:t>09.06.2014</a:t>
             </a:fld>
             <a:endParaRPr lang="de-DE"/>
           </a:p>
@@ -1337,7 +1337,7 @@
             <a:fld id="{1BA50D42-C9CD-4801-B293-61D1F53EC57E}" type="datetimeFigureOut">
               <a:rPr lang="de-DE" smtClean="0"/>
               <a:pPr/>
-              <a:t>08.06.2014</a:t>
+              <a:t>09.06.2014</a:t>
             </a:fld>
             <a:endParaRPr lang="de-DE"/>
           </a:p>
@@ -1756,7 +1756,7 @@
             <a:fld id="{1BA50D42-C9CD-4801-B293-61D1F53EC57E}" type="datetimeFigureOut">
               <a:rPr lang="de-DE" smtClean="0"/>
               <a:pPr/>
-              <a:t>08.06.2014</a:t>
+              <a:t>09.06.2014</a:t>
             </a:fld>
             <a:endParaRPr lang="de-DE"/>
           </a:p>
@@ -1871,7 +1871,7 @@
             <a:fld id="{1BA50D42-C9CD-4801-B293-61D1F53EC57E}" type="datetimeFigureOut">
               <a:rPr lang="de-DE" smtClean="0"/>
               <a:pPr/>
-              <a:t>08.06.2014</a:t>
+              <a:t>09.06.2014</a:t>
             </a:fld>
             <a:endParaRPr lang="de-DE"/>
           </a:p>
@@ -1963,7 +1963,7 @@
             <a:fld id="{1BA50D42-C9CD-4801-B293-61D1F53EC57E}" type="datetimeFigureOut">
               <a:rPr lang="de-DE" smtClean="0"/>
               <a:pPr/>
-              <a:t>08.06.2014</a:t>
+              <a:t>09.06.2014</a:t>
             </a:fld>
             <a:endParaRPr lang="de-DE"/>
           </a:p>
@@ -2237,7 +2237,7 @@
             <a:fld id="{1BA50D42-C9CD-4801-B293-61D1F53EC57E}" type="datetimeFigureOut">
               <a:rPr lang="de-DE" smtClean="0"/>
               <a:pPr/>
-              <a:t>08.06.2014</a:t>
+              <a:t>09.06.2014</a:t>
             </a:fld>
             <a:endParaRPr lang="de-DE"/>
           </a:p>
@@ -2487,7 +2487,7 @@
             <a:fld id="{1BA50D42-C9CD-4801-B293-61D1F53EC57E}" type="datetimeFigureOut">
               <a:rPr lang="de-DE" smtClean="0"/>
               <a:pPr/>
-              <a:t>08.06.2014</a:t>
+              <a:t>09.06.2014</a:t>
             </a:fld>
             <a:endParaRPr lang="de-DE"/>
           </a:p>
@@ -2697,7 +2697,7 @@
             <a:fld id="{1BA50D42-C9CD-4801-B293-61D1F53EC57E}" type="datetimeFigureOut">
               <a:rPr lang="de-DE" smtClean="0"/>
               <a:pPr/>
-              <a:t>08.06.2014</a:t>
+              <a:t>09.06.2014</a:t>
             </a:fld>
             <a:endParaRPr lang="de-DE"/>
           </a:p>
@@ -3173,7 +3173,29 @@
           <a:p>
             <a:r>
               <a:rPr lang="de-CH" dirty="0" smtClean="0"/>
-              <a:t>80%-20% Regel</a:t>
+              <a:t>80%-20% </a:t>
+            </a:r>
+            <a:r>
+              <a:rPr lang="de-CH" dirty="0" smtClean="0"/>
+              <a:t>Regel</a:t>
+            </a:r>
+          </a:p>
+          <a:p>
+            <a:r>
+              <a:rPr lang="de-CH" dirty="0" smtClean="0"/>
+              <a:t>Je „höher“ man kommt, desto mehr </a:t>
+            </a:r>
+            <a:r>
+              <a:rPr lang="de-CH" dirty="0" err="1" smtClean="0"/>
+              <a:t>datensätze</a:t>
+            </a:r>
+            <a:r>
+              <a:rPr lang="de-CH" dirty="0" smtClean="0"/>
+              <a:t> braucht man </a:t>
+            </a:r>
+            <a:r>
+              <a:rPr lang="de-CH" smtClean="0"/>
+              <a:t>zum validieren.</a:t>
             </a:r>
             <a:endParaRPr lang="de-CH" dirty="0"/>
           </a:p>

</xml_diff>